<commit_message>
more re-writes of scan_eval
</commit_message>
<xml_diff>
--- a/presentations/DESY - Code Handover.pptx
+++ b/presentations/DESY - Code Handover.pptx
@@ -269,7 +269,7 @@
           <a:p>
             <a:fld id="{FC19D655-BC36-4532-8E9C-4663B89DA152}" type="datetimeFigureOut">
               <a:rPr lang="en-GB" smtClean="0"/>
-              <a:t>21/08/2023</a:t>
+              <a:t>25/08/2023</a:t>
             </a:fld>
             <a:endParaRPr lang="en-GB"/>
           </a:p>
@@ -469,7 +469,7 @@
           <a:p>
             <a:fld id="{FC19D655-BC36-4532-8E9C-4663B89DA152}" type="datetimeFigureOut">
               <a:rPr lang="en-GB" smtClean="0"/>
-              <a:t>21/08/2023</a:t>
+              <a:t>25/08/2023</a:t>
             </a:fld>
             <a:endParaRPr lang="en-GB"/>
           </a:p>
@@ -679,7 +679,7 @@
           <a:p>
             <a:fld id="{FC19D655-BC36-4532-8E9C-4663B89DA152}" type="datetimeFigureOut">
               <a:rPr lang="en-GB" smtClean="0"/>
-              <a:t>21/08/2023</a:t>
+              <a:t>25/08/2023</a:t>
             </a:fld>
             <a:endParaRPr lang="en-GB"/>
           </a:p>
@@ -879,7 +879,7 @@
           <a:p>
             <a:fld id="{FC19D655-BC36-4532-8E9C-4663B89DA152}" type="datetimeFigureOut">
               <a:rPr lang="en-GB" smtClean="0"/>
-              <a:t>21/08/2023</a:t>
+              <a:t>25/08/2023</a:t>
             </a:fld>
             <a:endParaRPr lang="en-GB"/>
           </a:p>
@@ -1155,7 +1155,7 @@
           <a:p>
             <a:fld id="{FC19D655-BC36-4532-8E9C-4663B89DA152}" type="datetimeFigureOut">
               <a:rPr lang="en-GB" smtClean="0"/>
-              <a:t>21/08/2023</a:t>
+              <a:t>25/08/2023</a:t>
             </a:fld>
             <a:endParaRPr lang="en-GB"/>
           </a:p>
@@ -1423,7 +1423,7 @@
           <a:p>
             <a:fld id="{FC19D655-BC36-4532-8E9C-4663B89DA152}" type="datetimeFigureOut">
               <a:rPr lang="en-GB" smtClean="0"/>
-              <a:t>21/08/2023</a:t>
+              <a:t>25/08/2023</a:t>
             </a:fld>
             <a:endParaRPr lang="en-GB"/>
           </a:p>
@@ -1838,7 +1838,7 @@
           <a:p>
             <a:fld id="{FC19D655-BC36-4532-8E9C-4663B89DA152}" type="datetimeFigureOut">
               <a:rPr lang="en-GB" smtClean="0"/>
-              <a:t>21/08/2023</a:t>
+              <a:t>25/08/2023</a:t>
             </a:fld>
             <a:endParaRPr lang="en-GB"/>
           </a:p>
@@ -1980,7 +1980,7 @@
           <a:p>
             <a:fld id="{FC19D655-BC36-4532-8E9C-4663B89DA152}" type="datetimeFigureOut">
               <a:rPr lang="en-GB" smtClean="0"/>
-              <a:t>21/08/2023</a:t>
+              <a:t>25/08/2023</a:t>
             </a:fld>
             <a:endParaRPr lang="en-GB"/>
           </a:p>
@@ -2093,7 +2093,7 @@
           <a:p>
             <a:fld id="{FC19D655-BC36-4532-8E9C-4663B89DA152}" type="datetimeFigureOut">
               <a:rPr lang="en-GB" smtClean="0"/>
-              <a:t>21/08/2023</a:t>
+              <a:t>25/08/2023</a:t>
             </a:fld>
             <a:endParaRPr lang="en-GB"/>
           </a:p>
@@ -2406,7 +2406,7 @@
           <a:p>
             <a:fld id="{FC19D655-BC36-4532-8E9C-4663B89DA152}" type="datetimeFigureOut">
               <a:rPr lang="en-GB" smtClean="0"/>
-              <a:t>21/08/2023</a:t>
+              <a:t>25/08/2023</a:t>
             </a:fld>
             <a:endParaRPr lang="en-GB"/>
           </a:p>
@@ -2695,7 +2695,7 @@
           <a:p>
             <a:fld id="{FC19D655-BC36-4532-8E9C-4663B89DA152}" type="datetimeFigureOut">
               <a:rPr lang="en-GB" smtClean="0"/>
-              <a:t>21/08/2023</a:t>
+              <a:t>25/08/2023</a:t>
             </a:fld>
             <a:endParaRPr lang="en-GB"/>
           </a:p>
@@ -2938,7 +2938,7 @@
           <a:p>
             <a:fld id="{FC19D655-BC36-4532-8E9C-4663B89DA152}" type="datetimeFigureOut">
               <a:rPr lang="en-GB" smtClean="0"/>
-              <a:t>21/08/2023</a:t>
+              <a:t>25/08/2023</a:t>
             </a:fld>
             <a:endParaRPr lang="en-GB"/>
           </a:p>
@@ -4394,6 +4394,108 @@
           </a:p>
         </p:txBody>
       </p:sp>
+      <p:sp>
+        <p:nvSpPr>
+          <p:cNvPr id="21" name="Rectangle 20">
+            <a:extLst>
+              <a:ext uri="{FF2B5EF4-FFF2-40B4-BE49-F238E27FC236}">
+                <a16:creationId xmlns:a16="http://schemas.microsoft.com/office/drawing/2014/main" id="{85DD2032-FD90-7762-73FD-A5CCF6C505B5}"/>
+              </a:ext>
+            </a:extLst>
+          </p:cNvPr>
+          <p:cNvSpPr/>
+          <p:nvPr/>
+        </p:nvSpPr>
+        <p:spPr>
+          <a:xfrm>
+            <a:off x="391227" y="5656923"/>
+            <a:ext cx="1981743" cy="774048"/>
+          </a:xfrm>
+          <a:prstGeom prst="rect">
+            <a:avLst/>
+          </a:prstGeom>
+          <a:solidFill>
+            <a:srgbClr val="7030A0"/>
+          </a:solidFill>
+        </p:spPr>
+        <p:style>
+          <a:lnRef idx="2">
+            <a:schemeClr val="accent1">
+              <a:shade val="15000"/>
+            </a:schemeClr>
+          </a:lnRef>
+          <a:fillRef idx="1">
+            <a:schemeClr val="accent1"/>
+          </a:fillRef>
+          <a:effectRef idx="0">
+            <a:schemeClr val="accent1"/>
+          </a:effectRef>
+          <a:fontRef idx="minor">
+            <a:schemeClr val="lt1"/>
+          </a:fontRef>
+        </p:style>
+        <p:txBody>
+          <a:bodyPr rtlCol="0" anchor="ctr"/>
+          <a:lstStyle/>
+          <a:p>
+            <a:pPr algn="ctr"/>
+            <a:r>
+              <a:rPr lang="en-GB" dirty="0"/>
+              <a:t>various other files</a:t>
+            </a:r>
+          </a:p>
+        </p:txBody>
+      </p:sp>
+      <p:sp>
+        <p:nvSpPr>
+          <p:cNvPr id="24" name="Rectangle 23">
+            <a:extLst>
+              <a:ext uri="{FF2B5EF4-FFF2-40B4-BE49-F238E27FC236}">
+                <a16:creationId xmlns:a16="http://schemas.microsoft.com/office/drawing/2014/main" id="{DC3EB9FF-16C3-250F-E594-BC934E4C03BF}"/>
+              </a:ext>
+            </a:extLst>
+          </p:cNvPr>
+          <p:cNvSpPr/>
+          <p:nvPr/>
+        </p:nvSpPr>
+        <p:spPr>
+          <a:xfrm>
+            <a:off x="205273" y="5472434"/>
+            <a:ext cx="2416629" cy="1086986"/>
+          </a:xfrm>
+          <a:prstGeom prst="rect">
+            <a:avLst/>
+          </a:prstGeom>
+          <a:noFill/>
+          <a:ln>
+            <a:prstDash val="lgDash"/>
+          </a:ln>
+        </p:spPr>
+        <p:style>
+          <a:lnRef idx="2">
+            <a:schemeClr val="accent1">
+              <a:shade val="15000"/>
+            </a:schemeClr>
+          </a:lnRef>
+          <a:fillRef idx="1">
+            <a:schemeClr val="accent1"/>
+          </a:fillRef>
+          <a:effectRef idx="0">
+            <a:schemeClr val="accent1"/>
+          </a:effectRef>
+          <a:fontRef idx="minor">
+            <a:schemeClr val="lt1"/>
+          </a:fontRef>
+        </p:style>
+        <p:txBody>
+          <a:bodyPr rtlCol="0" anchor="ctr"/>
+          <a:lstStyle/>
+          <a:p>
+            <a:pPr algn="ctr"/>
+            <a:endParaRPr lang="en-GB"/>
+          </a:p>
+        </p:txBody>
+      </p:sp>
     </p:spTree>
     <p:extLst>
       <p:ext uri="{BB962C8B-B14F-4D97-AF65-F5344CB8AC3E}">
@@ -4502,19 +4604,19 @@
           <a:p>
             <a:r>
               <a:rPr lang="en-GB" dirty="0"/>
-              <a:t>All code files are extensively commented </a:t>
-            </a:r>
-          </a:p>
-          <a:p>
-            <a:r>
-              <a:rPr lang="en-GB" dirty="0"/>
-              <a:t>All relevant settings and parameters can be set at the top of each file</a:t>
-            </a:r>
-          </a:p>
-          <a:p>
-            <a:r>
-              <a:rPr lang="en-GB" dirty="0"/>
-              <a:t>All files will run directly upon execution, without having to add function calls or command-line arguments</a:t>
+              <a:t>All code files are commented </a:t>
+            </a:r>
+          </a:p>
+          <a:p>
+            <a:r>
+              <a:rPr lang="en-GB" dirty="0"/>
+              <a:t>Generally, relevant settings and parameters can be set at the top of each file</a:t>
+            </a:r>
+          </a:p>
+          <a:p>
+            <a:r>
+              <a:rPr lang="en-GB" dirty="0"/>
+              <a:t>Files will run directly upon execution, without having to add function calls or command-line arguments</a:t>
             </a:r>
           </a:p>
           <a:p>
@@ -4614,7 +4716,7 @@
         <p:spPr/>
         <p:txBody>
           <a:bodyPr>
-            <a:normAutofit fontScale="85000" lnSpcReduction="20000"/>
+            <a:normAutofit fontScale="70000" lnSpcReduction="20000"/>
           </a:bodyPr>
           <a:lstStyle/>
           <a:p>
@@ -4684,6 +4786,20 @@
               <a:buChar char="Ø"/>
             </a:pPr>
             <a:r>
+              <a:rPr lang="en-GB" dirty="0">
+                <a:solidFill>
+                  <a:srgbClr val="002060"/>
+                </a:solidFill>
+              </a:rPr>
+              <a:t> manuscript_spectra.py</a:t>
+            </a:r>
+          </a:p>
+          <a:p>
+            <a:pPr lvl="1">
+              <a:buFont typeface="Wingdings" panose="05000000000000000000" pitchFamily="2" charset="2"/>
+              <a:buChar char="Ø"/>
+            </a:pPr>
+            <a:r>
               <a:rPr lang="en-GB" i="1" dirty="0"/>
               <a:t> input </a:t>
             </a:r>
@@ -4835,12 +4951,33 @@
               <a:rPr lang="en-GB" i="1" dirty="0" err="1"/>
               <a:t>scan_analysis</a:t>
             </a:r>
-            <a:endParaRPr lang="en-GB" i="1" dirty="0"/>
-          </a:p>
-          <a:p>
-            <a:r>
-              <a:rPr lang="en-GB" dirty="0"/>
-              <a:t>It can be convenient to add additional directories to store output (especially for parameter scans) in order to declutter the </a:t>
+            <a:r>
+              <a:rPr lang="en-GB" i="1" dirty="0"/>
+              <a:t> </a:t>
+            </a:r>
+          </a:p>
+          <a:p>
+            <a:pPr lvl="1">
+              <a:buFont typeface="Wingdings" panose="05000000000000000000" pitchFamily="2" charset="2"/>
+              <a:buChar char="Ø"/>
+            </a:pPr>
+            <a:r>
+              <a:rPr lang="en-GB" dirty="0">
+                <a:solidFill>
+                  <a:srgbClr val="002060"/>
+                </a:solidFill>
+              </a:rPr>
+              <a:t> manuscript_spectra.png </a:t>
+            </a:r>
+            <a:r>
+              <a:rPr lang="en-GB" dirty="0"/>
+              <a:t>was used to produce specific spectral plots for the manuscript </a:t>
+            </a:r>
+          </a:p>
+          <a:p>
+            <a:r>
+              <a:rPr lang="en-GB" dirty="0"/>
+              <a:t>It can be convenient to add additional directories to store output (especially for pressure scans) in order to declutter the </a:t>
             </a:r>
             <a:r>
               <a:rPr lang="en-GB" i="1" dirty="0"/>
@@ -5137,7 +5274,7 @@
                   <a:srgbClr val="002060"/>
                 </a:solidFill>
               </a:rPr>
-              <a:t>”</a:t>
+              <a:t>” (1/3)</a:t>
             </a:r>
           </a:p>
         </p:txBody>
@@ -5161,7 +5298,7 @@
         <p:spPr/>
         <p:txBody>
           <a:bodyPr>
-            <a:normAutofit lnSpcReduction="10000"/>
+            <a:normAutofit fontScale="85000" lnSpcReduction="10000"/>
           </a:bodyPr>
           <a:lstStyle/>
           <a:p>
@@ -5231,6 +5368,43 @@
               <a:rPr lang="en-GB" dirty="0"/>
               <a:t>The following two slides explain the basic usage of the file but do not cover much of the logic behind the code</a:t>
             </a:r>
+          </a:p>
+          <a:p>
+            <a:r>
+              <a:rPr lang="en-GB" dirty="0"/>
+              <a:t>To run the code and generate simulations, simply enter </a:t>
+            </a:r>
+            <a:r>
+              <a:rPr lang="en-GB" dirty="0" err="1">
+                <a:solidFill>
+                  <a:srgbClr val="7030A0"/>
+                </a:solidFill>
+              </a:rPr>
+              <a:t>julia</a:t>
+            </a:r>
+            <a:r>
+              <a:rPr lang="en-GB" dirty="0">
+                <a:solidFill>
+                  <a:srgbClr val="7030A0"/>
+                </a:solidFill>
+              </a:rPr>
+              <a:t> </a:t>
+            </a:r>
+            <a:r>
+              <a:rPr lang="en-GB" dirty="0" err="1">
+                <a:solidFill>
+                  <a:srgbClr val="7030A0"/>
+                </a:solidFill>
+              </a:rPr>
+              <a:t>THG_sim_main.jl</a:t>
+            </a:r>
+            <a:r>
+              <a:rPr lang="en-GB" dirty="0"/>
+              <a:t> into the terminal and execute after specifying appropriate settings in the file </a:t>
+            </a:r>
+          </a:p>
+          <a:p>
+            <a:endParaRPr lang="en-GB" dirty="0"/>
           </a:p>
         </p:txBody>
       </p:sp>
@@ -5307,7 +5481,7 @@
                   <a:srgbClr val="002060"/>
                 </a:solidFill>
               </a:rPr>
-              <a:t>”</a:t>
+              <a:t>” (2/3)</a:t>
             </a:r>
             <a:endParaRPr lang="en-GB" dirty="0"/>
           </a:p>
@@ -5362,7 +5536,7 @@
             </a:pPr>
             <a:r>
               <a:rPr lang="en-GB" dirty="0"/>
-              <a:t> the output of a single run is stored in a new directory in the output directory </a:t>
+              <a:t> the output in either case is stored in a new subdirectory in the output directory </a:t>
             </a:r>
           </a:p>
           <a:p>
@@ -5372,17 +5546,7 @@
             </a:pPr>
             <a:r>
               <a:rPr lang="en-GB" dirty="0"/>
-              <a:t> for a pressure scan, a separate directory in the output directory is created for each run in the scan </a:t>
-            </a:r>
-          </a:p>
-          <a:p>
-            <a:pPr lvl="1">
-              <a:buFont typeface="Wingdings" panose="05000000000000000000" pitchFamily="2" charset="2"/>
-              <a:buChar char="Ø"/>
-            </a:pPr>
-            <a:r>
-              <a:rPr lang="en-GB" dirty="0"/>
-              <a:t> pressure scans are implemented as looped single runs with some additional constraints </a:t>
+              <a:t>pressure scans are implemented as looped single runs with some additional constraints </a:t>
             </a:r>
           </a:p>
           <a:p>
@@ -5412,7 +5576,7 @@
             </a:r>
             <a:r>
               <a:rPr lang="en-GB" dirty="0"/>
-              <a:t>is used to toggle between these two modes</a:t>
+              <a:t>is used to toggle between these two operation modes</a:t>
             </a:r>
           </a:p>
           <a:p>
@@ -5740,7 +5904,7 @@
                   <a:srgbClr val="002060"/>
                 </a:solidFill>
               </a:rPr>
-              <a:t>”</a:t>
+              <a:t>” (3/3)</a:t>
             </a:r>
             <a:endParaRPr lang="en-GB" dirty="0"/>
           </a:p>
@@ -5850,7 +6014,7 @@
           <a:p>
             <a:r>
               <a:rPr lang="en-GB" dirty="0"/>
-              <a:t>Note: the file names for the input files are set in the section “file handling” underneath “set physical parameters”</a:t>
+              <a:t>Note: the file names for the input files are set in the section “file handling” underneath “plot settings”</a:t>
             </a:r>
           </a:p>
           <a:p>
@@ -5957,13 +6121,35 @@
         </p:nvSpPr>
         <p:spPr/>
         <p:txBody>
-          <a:bodyPr/>
-          <a:lstStyle/>
-          <a:p>
-            <a:r>
-              <a:rPr lang="en-GB" dirty="0"/>
-              <a:t>As described earlier, the output of a pressure scan consists entirely of raw, un-analysed data </a:t>
-            </a:r>
+          <a:bodyPr>
+            <a:normAutofit lnSpcReduction="10000"/>
+          </a:bodyPr>
+          <a:lstStyle/>
+          <a:p>
+            <a:r>
+              <a:rPr lang="en-GB" dirty="0"/>
+              <a:t>As described earlier, the output of a pressure scan consists entirely of raw, un-analysed data (see slide 2 on the main file)</a:t>
+            </a:r>
+          </a:p>
+          <a:p>
+            <a:r>
+              <a:rPr lang="en-GB" dirty="0"/>
+              <a:t>The processing of this data happens in </a:t>
+            </a:r>
+            <a:r>
+              <a:rPr lang="en-GB" dirty="0">
+                <a:solidFill>
+                  <a:srgbClr val="002060"/>
+                </a:solidFill>
+              </a:rPr>
+              <a:t>scan_eval.py </a:t>
+            </a:r>
+          </a:p>
+          <a:p>
+            <a:endParaRPr lang="en-GB" dirty="0"/>
+          </a:p>
+          <a:p>
+            <a:endParaRPr lang="en-GB" dirty="0"/>
           </a:p>
           <a:p>
             <a:endParaRPr lang="en-GB" dirty="0"/>

</xml_diff>